<commit_message>
Added classification for JTL
</commit_message>
<xml_diff>
--- a/diagrams/f2p-case/Metamodels.pptx
+++ b/diagrams/f2p-case/Metamodels.pptx
@@ -243,7 +243,7 @@
           <a:p>
             <a:fld id="{B6391CA5-9E0E-4446-A9D7-615ACC2704AF}" type="datetimeFigureOut">
               <a:rPr lang="de-DE" smtClean="0"/>
-              <a:t>14.08.2018</a:t>
+              <a:t>26.10.2018</a:t>
             </a:fld>
             <a:endParaRPr lang="de-DE"/>
           </a:p>
@@ -413,7 +413,7 @@
           <a:p>
             <a:fld id="{B6391CA5-9E0E-4446-A9D7-615ACC2704AF}" type="datetimeFigureOut">
               <a:rPr lang="de-DE" smtClean="0"/>
-              <a:t>14.08.2018</a:t>
+              <a:t>26.10.2018</a:t>
             </a:fld>
             <a:endParaRPr lang="de-DE"/>
           </a:p>
@@ -593,7 +593,7 @@
           <a:p>
             <a:fld id="{B6391CA5-9E0E-4446-A9D7-615ACC2704AF}" type="datetimeFigureOut">
               <a:rPr lang="de-DE" smtClean="0"/>
-              <a:t>14.08.2018</a:t>
+              <a:t>26.10.2018</a:t>
             </a:fld>
             <a:endParaRPr lang="de-DE"/>
           </a:p>
@@ -763,7 +763,7 @@
           <a:p>
             <a:fld id="{B6391CA5-9E0E-4446-A9D7-615ACC2704AF}" type="datetimeFigureOut">
               <a:rPr lang="de-DE" smtClean="0"/>
-              <a:t>14.08.2018</a:t>
+              <a:t>26.10.2018</a:t>
             </a:fld>
             <a:endParaRPr lang="de-DE"/>
           </a:p>
@@ -1009,7 +1009,7 @@
           <a:p>
             <a:fld id="{B6391CA5-9E0E-4446-A9D7-615ACC2704AF}" type="datetimeFigureOut">
               <a:rPr lang="de-DE" smtClean="0"/>
-              <a:t>14.08.2018</a:t>
+              <a:t>26.10.2018</a:t>
             </a:fld>
             <a:endParaRPr lang="de-DE"/>
           </a:p>
@@ -1241,7 +1241,7 @@
           <a:p>
             <a:fld id="{B6391CA5-9E0E-4446-A9D7-615ACC2704AF}" type="datetimeFigureOut">
               <a:rPr lang="de-DE" smtClean="0"/>
-              <a:t>14.08.2018</a:t>
+              <a:t>26.10.2018</a:t>
             </a:fld>
             <a:endParaRPr lang="de-DE"/>
           </a:p>
@@ -1608,7 +1608,7 @@
           <a:p>
             <a:fld id="{B6391CA5-9E0E-4446-A9D7-615ACC2704AF}" type="datetimeFigureOut">
               <a:rPr lang="de-DE" smtClean="0"/>
-              <a:t>14.08.2018</a:t>
+              <a:t>26.10.2018</a:t>
             </a:fld>
             <a:endParaRPr lang="de-DE"/>
           </a:p>
@@ -1726,7 +1726,7 @@
           <a:p>
             <a:fld id="{B6391CA5-9E0E-4446-A9D7-615ACC2704AF}" type="datetimeFigureOut">
               <a:rPr lang="de-DE" smtClean="0"/>
-              <a:t>14.08.2018</a:t>
+              <a:t>26.10.2018</a:t>
             </a:fld>
             <a:endParaRPr lang="de-DE"/>
           </a:p>
@@ -1821,7 +1821,7 @@
           <a:p>
             <a:fld id="{B6391CA5-9E0E-4446-A9D7-615ACC2704AF}" type="datetimeFigureOut">
               <a:rPr lang="de-DE" smtClean="0"/>
-              <a:t>14.08.2018</a:t>
+              <a:t>26.10.2018</a:t>
             </a:fld>
             <a:endParaRPr lang="de-DE"/>
           </a:p>
@@ -2098,7 +2098,7 @@
           <a:p>
             <a:fld id="{B6391CA5-9E0E-4446-A9D7-615ACC2704AF}" type="datetimeFigureOut">
               <a:rPr lang="de-DE" smtClean="0"/>
-              <a:t>14.08.2018</a:t>
+              <a:t>26.10.2018</a:t>
             </a:fld>
             <a:endParaRPr lang="de-DE"/>
           </a:p>
@@ -2351,7 +2351,7 @@
           <a:p>
             <a:fld id="{B6391CA5-9E0E-4446-A9D7-615ACC2704AF}" type="datetimeFigureOut">
               <a:rPr lang="de-DE" smtClean="0"/>
-              <a:t>14.08.2018</a:t>
+              <a:t>26.10.2018</a:t>
             </a:fld>
             <a:endParaRPr lang="de-DE"/>
           </a:p>
@@ -2564,7 +2564,7 @@
           <a:p>
             <a:fld id="{B6391CA5-9E0E-4446-A9D7-615ACC2704AF}" type="datetimeFigureOut">
               <a:rPr lang="de-DE" smtClean="0"/>
-              <a:t>14.08.2018</a:t>
+              <a:t>26.10.2018</a:t>
             </a:fld>
             <a:endParaRPr lang="de-DE"/>
           </a:p>
@@ -3108,14 +3108,7 @@
                   <a:latin typeface="Consolas" panose="020B0609020204030204" pitchFamily="49" charset="0"/>
                   <a:cs typeface="Consolas" panose="020B0609020204030204" pitchFamily="49" charset="0"/>
                 </a:rPr>
-                <a:t> </a:t>
-              </a:r>
-              <a:r>
-                <a:rPr lang="de-DE" sz="1200" dirty="0" smtClean="0">
-                  <a:latin typeface="Consolas" panose="020B0609020204030204" pitchFamily="49" charset="0"/>
-                  <a:cs typeface="Consolas" panose="020B0609020204030204" pitchFamily="49" charset="0"/>
-                </a:rPr>
-                <a:t>: String</a:t>
+                <a:t> : String</a:t>
               </a:r>
             </a:p>
           </p:txBody>
@@ -3220,14 +3213,7 @@
                   <a:latin typeface="Consolas" panose="020B0609020204030204" pitchFamily="49" charset="0"/>
                   <a:cs typeface="Consolas" panose="020B0609020204030204" pitchFamily="49" charset="0"/>
                 </a:rPr>
-                <a:t> </a:t>
-              </a:r>
-              <a:r>
-                <a:rPr lang="de-DE" sz="1200" dirty="0" smtClean="0">
-                  <a:latin typeface="Consolas" panose="020B0609020204030204" pitchFamily="49" charset="0"/>
-                  <a:cs typeface="Consolas" panose="020B0609020204030204" pitchFamily="49" charset="0"/>
-                </a:rPr>
-                <a:t>: String</a:t>
+                <a:t> : String</a:t>
               </a:r>
             </a:p>
           </p:txBody>
@@ -4262,7 +4248,7 @@
                   <a:latin typeface="Consolas" panose="020B0609020204030204" pitchFamily="49" charset="0"/>
                   <a:cs typeface="Consolas" panose="020B0609020204030204" pitchFamily="49" charset="0"/>
                 </a:rPr>
-                <a:t>0..1</a:t>
+                <a:t>1</a:t>
               </a:r>
               <a:endParaRPr lang="en-US" sz="1200" dirty="0">
                 <a:latin typeface="Consolas" panose="020B0609020204030204" pitchFamily="49" charset="0"/>
@@ -4411,14 +4397,7 @@
                   <a:latin typeface="Consolas" panose="020B0609020204030204" pitchFamily="49" charset="0"/>
                   <a:cs typeface="Consolas" panose="020B0609020204030204" pitchFamily="49" charset="0"/>
                 </a:rPr>
-                <a:t> </a:t>
-              </a:r>
-              <a:r>
-                <a:rPr lang="de-DE" sz="1200" dirty="0" smtClean="0">
-                  <a:latin typeface="Consolas" panose="020B0609020204030204" pitchFamily="49" charset="0"/>
-                  <a:cs typeface="Consolas" panose="020B0609020204030204" pitchFamily="49" charset="0"/>
-                </a:rPr>
-                <a:t>: String</a:t>
+                <a:t> : String</a:t>
               </a:r>
             </a:p>
             <a:p>
@@ -4434,14 +4413,7 @@
                   <a:latin typeface="Consolas" panose="020B0609020204030204" pitchFamily="49" charset="0"/>
                   <a:cs typeface="Consolas" panose="020B0609020204030204" pitchFamily="49" charset="0"/>
                 </a:rPr>
-                <a:t> </a:t>
-              </a:r>
-              <a:r>
-                <a:rPr lang="de-DE" sz="1200" dirty="0" smtClean="0">
-                  <a:latin typeface="Consolas" panose="020B0609020204030204" pitchFamily="49" charset="0"/>
-                  <a:cs typeface="Consolas" panose="020B0609020204030204" pitchFamily="49" charset="0"/>
-                </a:rPr>
-                <a:t>: Date</a:t>
+                <a:t> : Date</a:t>
               </a:r>
             </a:p>
           </p:txBody>
@@ -4644,7 +4616,7 @@
                   <a:latin typeface="Consolas" panose="020B0609020204030204" pitchFamily="49" charset="0"/>
                   <a:cs typeface="Consolas" panose="020B0609020204030204" pitchFamily="49" charset="0"/>
                 </a:rPr>
-                <a:t>0..1</a:t>
+                <a:t>1</a:t>
               </a:r>
               <a:endParaRPr lang="en-US" sz="1200" dirty="0">
                 <a:latin typeface="Consolas" panose="020B0609020204030204" pitchFamily="49" charset="0"/>

</xml_diff>